<commit_message>
Updated code to add segregated models
</commit_message>
<xml_diff>
--- a/results/Interpretation.pptx
+++ b/results/Interpretation.pptx
@@ -107,6 +107,11 @@
       </a:defRPr>
     </a:lvl9pPr>
   </p:defaultTextStyle>
+  <p:extLst>
+    <p:ext uri="{EFAFB233-063F-42B5-8137-9DF3F51BA10A}">
+      <p15:sldGuideLst xmlns:p15="http://schemas.microsoft.com/office/powerpoint/2012/main"/>
+    </p:ext>
+  </p:extLst>
 </p:presentation>
 </file>
 
@@ -120,6 +125,30 @@
 
 <file path=ppt/changesInfos/changesInfo1.xml><?xml version="1.0" encoding="utf-8"?>
 <pc:chgInfo xmlns:a="http://schemas.openxmlformats.org/drawingml/2006/main" xmlns:r="http://schemas.openxmlformats.org/officeDocument/2006/relationships" xmlns:ac="http://schemas.microsoft.com/office/drawing/2013/main/command" xmlns:pc="http://schemas.microsoft.com/office/powerpoint/2013/main/command">
+  <pc:docChgLst>
+    <pc:chgData name="Jayita Chakraborty" userId="86bab1b1-daec-47e1-b802-5e9c550cd0fb" providerId="ADAL" clId="{875466C5-2F75-4887-818B-3D7FCDEC1FBE}"/>
+    <pc:docChg chg="modSld">
+      <pc:chgData name="Jayita Chakraborty" userId="86bab1b1-daec-47e1-b802-5e9c550cd0fb" providerId="ADAL" clId="{875466C5-2F75-4887-818B-3D7FCDEC1FBE}" dt="2024-12-22T23:27:40.529" v="6" actId="14100"/>
+      <pc:docMkLst>
+        <pc:docMk/>
+      </pc:docMkLst>
+      <pc:sldChg chg="modSp mod">
+        <pc:chgData name="Jayita Chakraborty" userId="86bab1b1-daec-47e1-b802-5e9c550cd0fb" providerId="ADAL" clId="{875466C5-2F75-4887-818B-3D7FCDEC1FBE}" dt="2024-12-22T23:27:40.529" v="6" actId="14100"/>
+        <pc:sldMkLst>
+          <pc:docMk/>
+          <pc:sldMk cId="288950771" sldId="259"/>
+        </pc:sldMkLst>
+        <pc:spChg chg="mod">
+          <ac:chgData name="Jayita Chakraborty" userId="86bab1b1-daec-47e1-b802-5e9c550cd0fb" providerId="ADAL" clId="{875466C5-2F75-4887-818B-3D7FCDEC1FBE}" dt="2024-12-22T23:27:40.529" v="6" actId="14100"/>
+          <ac:spMkLst>
+            <pc:docMk/>
+            <pc:sldMk cId="288950771" sldId="259"/>
+            <ac:spMk id="6" creationId="{CD025C4E-4142-6A1D-B2DD-B749443926D9}"/>
+          </ac:spMkLst>
+        </pc:spChg>
+      </pc:sldChg>
+    </pc:docChg>
+  </pc:docChgLst>
   <pc:docChgLst>
     <pc:chgData name="Jayita Chakraborty" userId="86bab1b1-daec-47e1-b802-5e9c550cd0fb" providerId="ADAL" clId="{331CA5ED-93CD-476C-AA73-5F9A51F7A38B}"/>
     <pc:docChg chg="undo custSel addSld modSld">
@@ -18255,7 +18284,7 @@
         <p:spPr>
           <a:xfrm>
             <a:off x="6423492" y="964800"/>
-            <a:ext cx="5549433" cy="5796000"/>
+            <a:ext cx="5549433" cy="5832000"/>
           </a:xfrm>
           <a:prstGeom prst="rect">
             <a:avLst/>
@@ -18339,7 +18368,7 @@
                 <a:latin typeface="Gill Sans Nova" panose="020B0602020104020203" pitchFamily="34" charset="0"/>
                 <a:cs typeface="Posterama" panose="020B0504020200020000" pitchFamily="34" charset="0"/>
               </a:rPr>
-              <a:t>Passenger boarding in a queue increases the likelihood of choosing metro compared to crowded boarding</a:t>
+              <a:t>Passenger boarding in a queue increases the likelihood of choosing metro compared to crowded boarding.</a:t>
             </a:r>
           </a:p>
         </p:txBody>

</xml_diff>